<commit_message>
novo dfd cenário 02 18102020
</commit_message>
<xml_diff>
--- a/artefatos/15 - Arquitetura de Negócio para cada Cenário v1.pptx
+++ b/artefatos/15 - Arquitetura de Negócio para cada Cenário v1.pptx
@@ -245,7 +245,7 @@
           <a:p>
             <a:fld id="{B318167A-7346-46C7-A193-E3829EEED7F1}" type="datetimeFigureOut">
               <a:rPr lang="pt-BR" smtClean="0"/>
-              <a:t>16/10/2020</a:t>
+              <a:t>18/10/2020</a:t>
             </a:fld>
             <a:endParaRPr lang="pt-BR"/>
           </a:p>
@@ -413,7 +413,7 @@
           <a:p>
             <a:fld id="{B318167A-7346-46C7-A193-E3829EEED7F1}" type="datetimeFigureOut">
               <a:rPr lang="pt-BR" smtClean="0"/>
-              <a:t>16/10/2020</a:t>
+              <a:t>18/10/2020</a:t>
             </a:fld>
             <a:endParaRPr lang="pt-BR"/>
           </a:p>
@@ -591,7 +591,7 @@
           <a:p>
             <a:fld id="{B318167A-7346-46C7-A193-E3829EEED7F1}" type="datetimeFigureOut">
               <a:rPr lang="pt-BR" smtClean="0"/>
-              <a:t>16/10/2020</a:t>
+              <a:t>18/10/2020</a:t>
             </a:fld>
             <a:endParaRPr lang="pt-BR"/>
           </a:p>
@@ -759,7 +759,7 @@
           <a:p>
             <a:fld id="{B318167A-7346-46C7-A193-E3829EEED7F1}" type="datetimeFigureOut">
               <a:rPr lang="pt-BR" smtClean="0"/>
-              <a:t>16/10/2020</a:t>
+              <a:t>18/10/2020</a:t>
             </a:fld>
             <a:endParaRPr lang="pt-BR"/>
           </a:p>
@@ -1004,7 +1004,7 @@
           <a:p>
             <a:fld id="{B318167A-7346-46C7-A193-E3829EEED7F1}" type="datetimeFigureOut">
               <a:rPr lang="pt-BR" smtClean="0"/>
-              <a:t>16/10/2020</a:t>
+              <a:t>18/10/2020</a:t>
             </a:fld>
             <a:endParaRPr lang="pt-BR"/>
           </a:p>
@@ -1233,7 +1233,7 @@
           <a:p>
             <a:fld id="{B318167A-7346-46C7-A193-E3829EEED7F1}" type="datetimeFigureOut">
               <a:rPr lang="pt-BR" smtClean="0"/>
-              <a:t>16/10/2020</a:t>
+              <a:t>18/10/2020</a:t>
             </a:fld>
             <a:endParaRPr lang="pt-BR"/>
           </a:p>
@@ -1597,7 +1597,7 @@
           <a:p>
             <a:fld id="{B318167A-7346-46C7-A193-E3829EEED7F1}" type="datetimeFigureOut">
               <a:rPr lang="pt-BR" smtClean="0"/>
-              <a:t>16/10/2020</a:t>
+              <a:t>18/10/2020</a:t>
             </a:fld>
             <a:endParaRPr lang="pt-BR"/>
           </a:p>
@@ -1714,7 +1714,7 @@
           <a:p>
             <a:fld id="{B318167A-7346-46C7-A193-E3829EEED7F1}" type="datetimeFigureOut">
               <a:rPr lang="pt-BR" smtClean="0"/>
-              <a:t>16/10/2020</a:t>
+              <a:t>18/10/2020</a:t>
             </a:fld>
             <a:endParaRPr lang="pt-BR"/>
           </a:p>
@@ -1809,7 +1809,7 @@
           <a:p>
             <a:fld id="{B318167A-7346-46C7-A193-E3829EEED7F1}" type="datetimeFigureOut">
               <a:rPr lang="pt-BR" smtClean="0"/>
-              <a:t>16/10/2020</a:t>
+              <a:t>18/10/2020</a:t>
             </a:fld>
             <a:endParaRPr lang="pt-BR"/>
           </a:p>
@@ -2084,7 +2084,7 @@
           <a:p>
             <a:fld id="{B318167A-7346-46C7-A193-E3829EEED7F1}" type="datetimeFigureOut">
               <a:rPr lang="pt-BR" smtClean="0"/>
-              <a:t>16/10/2020</a:t>
+              <a:t>18/10/2020</a:t>
             </a:fld>
             <a:endParaRPr lang="pt-BR"/>
           </a:p>
@@ -2336,7 +2336,7 @@
           <a:p>
             <a:fld id="{B318167A-7346-46C7-A193-E3829EEED7F1}" type="datetimeFigureOut">
               <a:rPr lang="pt-BR" smtClean="0"/>
-              <a:t>16/10/2020</a:t>
+              <a:t>18/10/2020</a:t>
             </a:fld>
             <a:endParaRPr lang="pt-BR"/>
           </a:p>
@@ -2547,7 +2547,7 @@
           <a:p>
             <a:fld id="{B318167A-7346-46C7-A193-E3829EEED7F1}" type="datetimeFigureOut">
               <a:rPr lang="pt-BR" smtClean="0"/>
-              <a:t>16/10/2020</a:t>
+              <a:t>18/10/2020</a:t>
             </a:fld>
             <a:endParaRPr lang="pt-BR"/>
           </a:p>
@@ -3502,7 +3502,7 @@
           <p:cNvPr id="11" name="Retângulo de cantos arredondados 10">
             <a:extLst>
               <a:ext uri="{FF2B5EF4-FFF2-40B4-BE49-F238E27FC236}">
-                <a16:creationId xmlns="" xmlns:a16="http://schemas.microsoft.com/office/drawing/2014/main" xmlns:lc="http://schemas.openxmlformats.org/drawingml/2006/lockedCanvas" id="{67FC9C97-6BBA-4BFC-A5E1-2436DE02BBE2}"/>
+                <a16:creationId xmlns:lc="http://schemas.openxmlformats.org/drawingml/2006/lockedCanvas" xmlns:a16="http://schemas.microsoft.com/office/drawing/2014/main" xmlns="" id="{67FC9C97-6BBA-4BFC-A5E1-2436DE02BBE2}"/>
               </a:ext>
             </a:extLst>
           </p:cNvPr>
@@ -4034,7 +4034,7 @@
           <p:cNvPr id="11" name="Retângulo de cantos arredondados 10">
             <a:extLst>
               <a:ext uri="{FF2B5EF4-FFF2-40B4-BE49-F238E27FC236}">
-                <a16:creationId xmlns="" xmlns:a16="http://schemas.microsoft.com/office/drawing/2014/main" xmlns:lc="http://schemas.openxmlformats.org/drawingml/2006/lockedCanvas" id="{67FC9C97-6BBA-4BFC-A5E1-2436DE02BBE2}"/>
+                <a16:creationId xmlns:lc="http://schemas.openxmlformats.org/drawingml/2006/lockedCanvas" xmlns:a16="http://schemas.microsoft.com/office/drawing/2014/main" xmlns="" id="{67FC9C97-6BBA-4BFC-A5E1-2436DE02BBE2}"/>
               </a:ext>
             </a:extLst>
           </p:cNvPr>
@@ -4561,7 +4561,7 @@
           <p:cNvPr id="11" name="Retângulo de cantos arredondados 10">
             <a:extLst>
               <a:ext uri="{FF2B5EF4-FFF2-40B4-BE49-F238E27FC236}">
-                <a16:creationId xmlns="" xmlns:a16="http://schemas.microsoft.com/office/drawing/2014/main" xmlns:lc="http://schemas.openxmlformats.org/drawingml/2006/lockedCanvas" id="{67FC9C97-6BBA-4BFC-A5E1-2436DE02BBE2}"/>
+                <a16:creationId xmlns:lc="http://schemas.openxmlformats.org/drawingml/2006/lockedCanvas" xmlns:a16="http://schemas.microsoft.com/office/drawing/2014/main" xmlns="" id="{67FC9C97-6BBA-4BFC-A5E1-2436DE02BBE2}"/>
               </a:ext>
             </a:extLst>
           </p:cNvPr>
@@ -5093,7 +5093,7 @@
           <p:cNvPr id="11" name="Retângulo de cantos arredondados 10">
             <a:extLst>
               <a:ext uri="{FF2B5EF4-FFF2-40B4-BE49-F238E27FC236}">
-                <a16:creationId xmlns="" xmlns:a16="http://schemas.microsoft.com/office/drawing/2014/main" xmlns:lc="http://schemas.openxmlformats.org/drawingml/2006/lockedCanvas" id="{67FC9C97-6BBA-4BFC-A5E1-2436DE02BBE2}"/>
+                <a16:creationId xmlns:lc="http://schemas.openxmlformats.org/drawingml/2006/lockedCanvas" xmlns:a16="http://schemas.microsoft.com/office/drawing/2014/main" xmlns="" id="{67FC9C97-6BBA-4BFC-A5E1-2436DE02BBE2}"/>
               </a:ext>
             </a:extLst>
           </p:cNvPr>

</xml_diff>